<commit_message>
Mise a jour dU Storyboard.pptx
</commit_message>
<xml_diff>
--- a/Storyboard.pptx
+++ b/Storyboard.pptx
@@ -104,6 +104,11 @@
       </a:defRPr>
     </a:lvl9pPr>
   </p:defaultTextStyle>
+  <p:extLst>
+    <p:ext uri="{EFAFB233-063F-42B5-8137-9DF3F51BA10A}">
+      <p15:sldGuideLst xmlns:p15="http://schemas.microsoft.com/office/powerpoint/2012/main"/>
+    </p:ext>
+  </p:extLst>
 </p:presentation>
 </file>
 
@@ -254,7 +259,7 @@
           <a:p>
             <a:fld id="{970ED6D8-A86D-4328-ABD0-CAEAC119677A}" type="datetimeFigureOut">
               <a:rPr lang="fr-FR" smtClean="0"/>
-              <a:t>15/04/2025</a:t>
+              <a:t>19/04/2025</a:t>
             </a:fld>
             <a:endParaRPr lang="fr-FR"/>
           </a:p>
@@ -452,7 +457,7 @@
           <a:p>
             <a:fld id="{970ED6D8-A86D-4328-ABD0-CAEAC119677A}" type="datetimeFigureOut">
               <a:rPr lang="fr-FR" smtClean="0"/>
-              <a:t>15/04/2025</a:t>
+              <a:t>19/04/2025</a:t>
             </a:fld>
             <a:endParaRPr lang="fr-FR"/>
           </a:p>
@@ -660,7 +665,7 @@
           <a:p>
             <a:fld id="{970ED6D8-A86D-4328-ABD0-CAEAC119677A}" type="datetimeFigureOut">
               <a:rPr lang="fr-FR" smtClean="0"/>
-              <a:t>15/04/2025</a:t>
+              <a:t>19/04/2025</a:t>
             </a:fld>
             <a:endParaRPr lang="fr-FR"/>
           </a:p>
@@ -858,7 +863,7 @@
           <a:p>
             <a:fld id="{970ED6D8-A86D-4328-ABD0-CAEAC119677A}" type="datetimeFigureOut">
               <a:rPr lang="fr-FR" smtClean="0"/>
-              <a:t>15/04/2025</a:t>
+              <a:t>19/04/2025</a:t>
             </a:fld>
             <a:endParaRPr lang="fr-FR"/>
           </a:p>
@@ -1133,7 +1138,7 @@
           <a:p>
             <a:fld id="{970ED6D8-A86D-4328-ABD0-CAEAC119677A}" type="datetimeFigureOut">
               <a:rPr lang="fr-FR" smtClean="0"/>
-              <a:t>15/04/2025</a:t>
+              <a:t>19/04/2025</a:t>
             </a:fld>
             <a:endParaRPr lang="fr-FR"/>
           </a:p>
@@ -1398,7 +1403,7 @@
           <a:p>
             <a:fld id="{970ED6D8-A86D-4328-ABD0-CAEAC119677A}" type="datetimeFigureOut">
               <a:rPr lang="fr-FR" smtClean="0"/>
-              <a:t>15/04/2025</a:t>
+              <a:t>19/04/2025</a:t>
             </a:fld>
             <a:endParaRPr lang="fr-FR"/>
           </a:p>
@@ -1810,7 +1815,7 @@
           <a:p>
             <a:fld id="{970ED6D8-A86D-4328-ABD0-CAEAC119677A}" type="datetimeFigureOut">
               <a:rPr lang="fr-FR" smtClean="0"/>
-              <a:t>15/04/2025</a:t>
+              <a:t>19/04/2025</a:t>
             </a:fld>
             <a:endParaRPr lang="fr-FR"/>
           </a:p>
@@ -1951,7 +1956,7 @@
           <a:p>
             <a:fld id="{970ED6D8-A86D-4328-ABD0-CAEAC119677A}" type="datetimeFigureOut">
               <a:rPr lang="fr-FR" smtClean="0"/>
-              <a:t>15/04/2025</a:t>
+              <a:t>19/04/2025</a:t>
             </a:fld>
             <a:endParaRPr lang="fr-FR"/>
           </a:p>
@@ -2064,7 +2069,7 @@
           <a:p>
             <a:fld id="{970ED6D8-A86D-4328-ABD0-CAEAC119677A}" type="datetimeFigureOut">
               <a:rPr lang="fr-FR" smtClean="0"/>
-              <a:t>15/04/2025</a:t>
+              <a:t>19/04/2025</a:t>
             </a:fld>
             <a:endParaRPr lang="fr-FR"/>
           </a:p>
@@ -2375,7 +2380,7 @@
           <a:p>
             <a:fld id="{970ED6D8-A86D-4328-ABD0-CAEAC119677A}" type="datetimeFigureOut">
               <a:rPr lang="fr-FR" smtClean="0"/>
-              <a:t>15/04/2025</a:t>
+              <a:t>19/04/2025</a:t>
             </a:fld>
             <a:endParaRPr lang="fr-FR"/>
           </a:p>
@@ -2663,7 +2668,7 @@
           <a:p>
             <a:fld id="{970ED6D8-A86D-4328-ABD0-CAEAC119677A}" type="datetimeFigureOut">
               <a:rPr lang="fr-FR" smtClean="0"/>
-              <a:t>15/04/2025</a:t>
+              <a:t>19/04/2025</a:t>
             </a:fld>
             <a:endParaRPr lang="fr-FR"/>
           </a:p>
@@ -2904,7 +2909,7 @@
           <a:p>
             <a:fld id="{970ED6D8-A86D-4328-ABD0-CAEAC119677A}" type="datetimeFigureOut">
               <a:rPr lang="fr-FR" smtClean="0"/>
-              <a:t>15/04/2025</a:t>
+              <a:t>19/04/2025</a:t>
             </a:fld>
             <a:endParaRPr lang="fr-FR"/>
           </a:p>
@@ -3835,7 +3840,7 @@
         </p:nvSpPr>
         <p:spPr>
           <a:xfrm>
-            <a:off x="2843293" y="1186643"/>
+            <a:off x="2776611" y="1186643"/>
             <a:ext cx="1870629" cy="411001"/>
           </a:xfrm>
           <a:prstGeom prst="rect">
@@ -3884,7 +3889,7 @@
         </p:nvSpPr>
         <p:spPr>
           <a:xfrm>
-            <a:off x="5506096" y="1194556"/>
+            <a:off x="5439414" y="1194556"/>
             <a:ext cx="1870629" cy="411001"/>
           </a:xfrm>
           <a:prstGeom prst="rect">
@@ -4287,8 +4292,8 @@
         </p:nvSpPr>
         <p:spPr>
           <a:xfrm>
-            <a:off x="617537" y="6485380"/>
-            <a:ext cx="2417399" cy="276999"/>
+            <a:off x="617538" y="6485380"/>
+            <a:ext cx="1873232" cy="276999"/>
           </a:xfrm>
           <a:prstGeom prst="rect">
             <a:avLst/>
@@ -4322,7 +4327,7 @@
         </p:nvSpPr>
         <p:spPr>
           <a:xfrm>
-            <a:off x="3287901" y="1952293"/>
+            <a:off x="3221219" y="1952293"/>
             <a:ext cx="2018026" cy="324822"/>
           </a:xfrm>
           <a:prstGeom prst="rect">
@@ -4383,7 +4388,7 @@
         </p:nvSpPr>
         <p:spPr>
           <a:xfrm>
-            <a:off x="3282944" y="2491545"/>
+            <a:off x="3216262" y="2491545"/>
             <a:ext cx="2018026" cy="324822"/>
           </a:xfrm>
           <a:prstGeom prst="rect">
@@ -4444,7 +4449,7 @@
         </p:nvSpPr>
         <p:spPr>
           <a:xfrm>
-            <a:off x="5909064" y="1941162"/>
+            <a:off x="5842382" y="1941162"/>
             <a:ext cx="2053572" cy="411000"/>
           </a:xfrm>
           <a:prstGeom prst="rect">
@@ -4505,7 +4510,7 @@
         </p:nvSpPr>
         <p:spPr>
           <a:xfrm>
-            <a:off x="5909064" y="2502389"/>
+            <a:off x="5842382" y="2502389"/>
             <a:ext cx="2053573" cy="498014"/>
           </a:xfrm>
           <a:prstGeom prst="rect">
@@ -4610,8 +4615,8 @@
         </p:nvCxnSpPr>
         <p:spPr>
           <a:xfrm rot="5400000">
-            <a:off x="4541469" y="-180952"/>
-            <a:ext cx="604734" cy="2130456"/>
+            <a:off x="4508128" y="-214293"/>
+            <a:ext cx="604734" cy="2197138"/>
           </a:xfrm>
           <a:prstGeom prst="bentConnector3">
             <a:avLst>
@@ -4652,8 +4657,8 @@
         </p:nvCxnSpPr>
         <p:spPr>
           <a:xfrm rot="16200000" flipH="1">
-            <a:off x="5868914" y="622058"/>
-            <a:ext cx="612647" cy="532347"/>
+            <a:off x="5835573" y="655399"/>
+            <a:ext cx="612647" cy="465665"/>
           </a:xfrm>
           <a:prstGeom prst="bentConnector3">
             <a:avLst>
@@ -4770,7 +4775,7 @@
         </p:nvCxnSpPr>
         <p:spPr>
           <a:xfrm rot="16200000" flipH="1">
-            <a:off x="2905121" y="1731924"/>
+            <a:off x="2838439" y="1731924"/>
             <a:ext cx="509088" cy="256472"/>
           </a:xfrm>
           <a:prstGeom prst="bentConnector2">
@@ -4809,7 +4814,7 @@
         </p:nvCxnSpPr>
         <p:spPr>
           <a:xfrm rot="16200000" flipH="1">
-            <a:off x="2632248" y="2003260"/>
+            <a:off x="2565566" y="2003260"/>
             <a:ext cx="1048398" cy="252994"/>
           </a:xfrm>
           <a:prstGeom prst="bentConnector2">
@@ -4848,7 +4853,7 @@
         </p:nvCxnSpPr>
         <p:spPr>
           <a:xfrm rot="16200000" flipH="1">
-            <a:off x="5507552" y="1745150"/>
+            <a:off x="5440870" y="1745150"/>
             <a:ext cx="541108" cy="261916"/>
           </a:xfrm>
           <a:prstGeom prst="bentConnector2">
@@ -4887,7 +4892,7 @@
         </p:nvCxnSpPr>
         <p:spPr>
           <a:xfrm rot="16200000" flipH="1">
-            <a:off x="5205184" y="2047516"/>
+            <a:off x="5138502" y="2047516"/>
             <a:ext cx="1145842" cy="261918"/>
           </a:xfrm>
           <a:prstGeom prst="bentConnector2">
@@ -5072,6 +5077,94 @@
             <a:avLst>
               <a:gd name="adj1" fmla="val 50000"/>
             </a:avLst>
+          </a:prstGeom>
+        </p:spPr>
+        <p:style>
+          <a:lnRef idx="2">
+            <a:schemeClr val="accent1"/>
+          </a:lnRef>
+          <a:fillRef idx="0">
+            <a:schemeClr val="accent1"/>
+          </a:fillRef>
+          <a:effectRef idx="1">
+            <a:schemeClr val="accent1"/>
+          </a:effectRef>
+          <a:fontRef idx="minor">
+            <a:schemeClr val="tx1"/>
+          </a:fontRef>
+        </p:style>
+      </p:cxnSp>
+      <p:sp>
+        <p:nvSpPr>
+          <p:cNvPr id="3" name="Rectangle 2">
+            <a:extLst>
+              <a:ext uri="{FF2B5EF4-FFF2-40B4-BE49-F238E27FC236}">
+                <a16:creationId xmlns:a16="http://schemas.microsoft.com/office/drawing/2014/main" id="{7E2747EE-B96C-307E-219E-B81767792FD2}"/>
+              </a:ext>
+            </a:extLst>
+          </p:cNvPr>
+          <p:cNvSpPr/>
+          <p:nvPr/>
+        </p:nvSpPr>
+        <p:spPr>
+          <a:xfrm>
+            <a:off x="6025325" y="4160312"/>
+            <a:ext cx="1870629" cy="411001"/>
+          </a:xfrm>
+          <a:prstGeom prst="rect">
+            <a:avLst/>
+          </a:prstGeom>
+        </p:spPr>
+        <p:style>
+          <a:lnRef idx="2">
+            <a:schemeClr val="accent1">
+              <a:shade val="15000"/>
+            </a:schemeClr>
+          </a:lnRef>
+          <a:fillRef idx="1">
+            <a:schemeClr val="accent1"/>
+          </a:fillRef>
+          <a:effectRef idx="0">
+            <a:schemeClr val="accent1"/>
+          </a:effectRef>
+          <a:fontRef idx="minor">
+            <a:schemeClr val="lt1"/>
+          </a:fontRef>
+        </p:style>
+        <p:txBody>
+          <a:bodyPr rtlCol="0" anchor="ctr"/>
+          <a:lstStyle/>
+          <a:p>
+            <a:pPr algn="ctr"/>
+            <a:r>
+              <a:rPr lang="fr-FR" sz="1200" dirty="0"/>
+              <a:t>Mes notifications</a:t>
+            </a:r>
+          </a:p>
+        </p:txBody>
+      </p:sp>
+      <p:cxnSp>
+        <p:nvCxnSpPr>
+          <p:cNvPr id="9" name="Connecteur : en angle 8">
+            <a:extLst>
+              <a:ext uri="{FF2B5EF4-FFF2-40B4-BE49-F238E27FC236}">
+                <a16:creationId xmlns:a16="http://schemas.microsoft.com/office/drawing/2014/main" id="{8B5BC0F4-ED67-EF0C-F29B-8A2C673D9E34}"/>
+              </a:ext>
+            </a:extLst>
+          </p:cNvPr>
+          <p:cNvCxnSpPr>
+            <a:stCxn id="35" idx="2"/>
+            <a:endCxn id="3" idx="0"/>
+          </p:cNvCxnSpPr>
+          <p:nvPr/>
+        </p:nvCxnSpPr>
+        <p:spPr>
+          <a:xfrm rot="5400000">
+            <a:off x="8278939" y="2352102"/>
+            <a:ext cx="489911" cy="3126508"/>
+          </a:xfrm>
+          <a:prstGeom prst="bentConnector3">
+            <a:avLst/>
           </a:prstGeom>
         </p:spPr>
         <p:style>

</xml_diff>